<commit_message>
docs: change letter to h5
</commit_message>
<xml_diff>
--- a/02-致未来的信.pptx
+++ b/02-致未来的信.pptx
@@ -8,7 +8,7 @@
     <p:notesMasterId r:id="rId3"/>
   </p:notesMasterIdLst>
   <p:sldIdLst>
-    <p:sldId id="256" r:id="rId2"/>
+    <p:sldId id="257" r:id="rId2"/>
   </p:sldIdLst>
   <p:sldSz cx="24384000" cy="13716000"/>
   <p:notesSz cx="6858000" cy="9144000"/>
@@ -310,6 +310,11 @@
       </a:defRPr>
     </a:lvl9pPr>
   </p:defaultTextStyle>
+  <p:extLst>
+    <p:ext uri="{EFAFB233-063F-42B5-8137-9DF3F51BA10A}">
+      <p15:sldGuideLst xmlns:p15="http://schemas.microsoft.com/office/powerpoint/2012/main"/>
+    </p:ext>
+  </p:extLst>
 </p:presentation>
 </file>
 
@@ -3948,7 +3953,7 @@
           </a:ln>
           <a:extLst>
             <a:ext uri="{C572A759-6A51-4108-AA02-DFA0A04FC94B}">
-              <ma14:wrappingTextBoxFlag xmlns:ma14="http://schemas.microsoft.com/office/mac/drawingml/2011/main" val="1"/>
+              <ma14:wrappingTextBoxFlag xmlns:ma14="http://schemas.microsoft.com/office/mac/drawingml/2011/main" xmlns="" val="1"/>
             </a:ext>
           </a:extLst>
         </p:spPr>
@@ -3987,7 +3992,7 @@
           </a:ln>
           <a:extLst>
             <a:ext uri="{C572A759-6A51-4108-AA02-DFA0A04FC94B}">
-              <ma14:wrappingTextBoxFlag xmlns:ma14="http://schemas.microsoft.com/office/mac/drawingml/2011/main" val="1"/>
+              <ma14:wrappingTextBoxFlag xmlns:ma14="http://schemas.microsoft.com/office/mac/drawingml/2011/main" xmlns="" val="1"/>
             </a:ext>
           </a:extLst>
         </p:spPr>
@@ -4897,6 +4902,16 @@
 <file path=ppt/slides/slide1.xml><?xml version="1.0" encoding="utf-8"?>
 <p:sld xmlns:a="http://schemas.openxmlformats.org/drawingml/2006/main" xmlns:r="http://schemas.openxmlformats.org/officeDocument/2006/relationships" xmlns:p="http://schemas.openxmlformats.org/presentationml/2006/main">
   <p:cSld>
+    <p:bg>
+      <p:bgPr>
+        <a:solidFill>
+          <a:schemeClr val="tx1">
+            <a:lumMod val="95000"/>
+          </a:schemeClr>
+        </a:solidFill>
+        <a:effectLst/>
+      </p:bgPr>
+    </p:bg>
     <p:spTree>
       <p:nvGrpSpPr>
         <p:cNvPr id="1" name=""/>
@@ -4913,707 +4928,147 @@
       </p:grpSpPr>
       <p:sp>
         <p:nvSpPr>
-          <p:cNvPr id="195" name="Shape 195"/>
+          <p:cNvPr id="2" name="矩形 1"/>
           <p:cNvSpPr/>
           <p:nvPr/>
         </p:nvSpPr>
         <p:spPr>
           <a:xfrm>
-            <a:off x="3922720" y="2565827"/>
-            <a:ext cx="1490788" cy="735837"/>
+            <a:off x="8739152" y="5264218"/>
+            <a:ext cx="12495728" cy="1938992"/>
           </a:xfrm>
           <a:prstGeom prst="rect">
             <a:avLst/>
           </a:prstGeom>
-          <a:ln w="12700">
-            <a:miter lim="400000"/>
-          </a:ln>
-          <a:extLst>
-            <a:ext uri="{C572A759-6A51-4108-AA02-DFA0A04FC94B}">
-              <ma14:wrappingTextBoxFlag xmlns:ma14="http://schemas.microsoft.com/office/mac/drawingml/2011/main" val="1"/>
-            </a:ext>
-          </a:extLst>
         </p:spPr>
         <p:txBody>
-          <a:bodyPr wrap="none" lIns="71435" tIns="71435" rIns="71435" bIns="71435">
+          <a:bodyPr wrap="none">
             <a:spAutoFit/>
           </a:bodyPr>
           <a:lstStyle/>
           <a:p>
-            <a:pPr algn="r" defTabSz="821529">
-              <a:lnSpc>
-                <a:spcPct val="120000"/>
-              </a:lnSpc>
-            </a:pPr>
-            <a:r>
-              <a:rPr sz="3500" b="1" dirty="0">
+            <a:r>
+              <a:rPr lang="zh-CN" altLang="en-US" sz="12000" b="1" dirty="0">
                 <a:solidFill>
-                  <a:srgbClr val="00FAA5"/>
+                  <a:schemeClr val="tx2">
+                    <a:lumMod val="75000"/>
+                  </a:schemeClr>
                 </a:solidFill>
-                <a:latin typeface="Microsoft YaHei Light" charset="-122"/>
-                <a:ea typeface="Microsoft YaHei Light" charset="-122"/>
-                <a:cs typeface="Microsoft YaHei Light" charset="-122"/>
+                <a:latin typeface="Microsoft YaHei" charset="-122"/>
+                <a:ea typeface="Microsoft YaHei" charset="-122"/>
+                <a:cs typeface="Microsoft YaHei" charset="-122"/>
               </a:rPr>
-              <a:t>收件人</a:t>
-            </a:r>
+              <a:t>半撇</a:t>
+            </a:r>
+            <a:r>
+              <a:rPr lang="zh-CN" altLang="en-US" sz="12000" b="1" dirty="0" smtClean="0">
+                <a:solidFill>
+                  <a:schemeClr val="tx2">
+                    <a:lumMod val="75000"/>
+                  </a:schemeClr>
+                </a:solidFill>
+                <a:latin typeface="Microsoft YaHei" charset="-122"/>
+                <a:ea typeface="Microsoft YaHei" charset="-122"/>
+                <a:cs typeface="Microsoft YaHei" charset="-122"/>
+              </a:rPr>
+              <a:t>私塾时光邮局</a:t>
+            </a:r>
+            <a:endParaRPr lang="zh-CN" altLang="en-US" sz="12000" b="1" dirty="0">
+              <a:solidFill>
+                <a:schemeClr val="tx2">
+                  <a:lumMod val="75000"/>
+                </a:schemeClr>
+              </a:solidFill>
+              <a:latin typeface="Microsoft YaHei" charset="-122"/>
+              <a:ea typeface="Microsoft YaHei" charset="-122"/>
+              <a:cs typeface="Microsoft YaHei" charset="-122"/>
+            </a:endParaRPr>
           </a:p>
         </p:txBody>
       </p:sp>
       <p:sp>
         <p:nvSpPr>
-          <p:cNvPr id="196" name="Shape 196"/>
+          <p:cNvPr id="3" name="矩形 2"/>
           <p:cNvSpPr/>
           <p:nvPr/>
         </p:nvSpPr>
         <p:spPr>
           <a:xfrm>
-            <a:off x="6125251" y="5052807"/>
-            <a:ext cx="13501637" cy="5260153"/>
+            <a:off x="8739152" y="7638104"/>
+            <a:ext cx="13649891" cy="861774"/>
           </a:xfrm>
           <a:prstGeom prst="rect">
             <a:avLst/>
           </a:prstGeom>
-          <a:ln w="12700">
-            <a:miter lim="400000"/>
-          </a:ln>
-          <a:extLst>
-            <a:ext uri="{C572A759-6A51-4108-AA02-DFA0A04FC94B}">
-              <ma14:wrappingTextBoxFlag xmlns:ma14="http://schemas.microsoft.com/office/mac/drawingml/2011/main" val="1"/>
-            </a:ext>
-          </a:extLst>
         </p:spPr>
         <p:txBody>
-          <a:bodyPr lIns="71435" tIns="71435" rIns="71435" bIns="71435">
+          <a:bodyPr wrap="none">
             <a:spAutoFit/>
           </a:bodyPr>
           <a:lstStyle/>
           <a:p>
-            <a:pPr algn="l" defTabSz="821529">
-              <a:lnSpc>
-                <a:spcPct val="120000"/>
-              </a:lnSpc>
-              <a:defRPr sz="3500" b="1">
-                <a:solidFill>
-                  <a:srgbClr val="00FAA5"/>
-                </a:solidFill>
-              </a:defRPr>
-            </a:pPr>
-            <a:r>
-              <a:rPr dirty="0">
-                <a:latin typeface="Microsoft YaHei Light" charset="-122"/>
-                <a:ea typeface="Microsoft YaHei Light" charset="-122"/>
-                <a:cs typeface="Microsoft YaHei Light" charset="-122"/>
-              </a:rPr>
-              <a:t>Hi，亲爱的我自己：</a:t>
-            </a:r>
-          </a:p>
-          <a:p>
-            <a:pPr algn="l" defTabSz="821529">
-              <a:lnSpc>
-                <a:spcPct val="120000"/>
-              </a:lnSpc>
-              <a:defRPr sz="3500" b="1">
-                <a:solidFill>
-                  <a:srgbClr val="00FAA5"/>
-                </a:solidFill>
-              </a:defRPr>
-            </a:pPr>
-            <a:endParaRPr dirty="0">
-              <a:latin typeface="Microsoft YaHei Light" charset="-122"/>
-              <a:ea typeface="Microsoft YaHei Light" charset="-122"/>
-              <a:cs typeface="Microsoft YaHei Light" charset="-122"/>
-            </a:endParaRPr>
-          </a:p>
-          <a:p>
-            <a:pPr algn="l" defTabSz="821529">
-              <a:lnSpc>
-                <a:spcPct val="120000"/>
-              </a:lnSpc>
-              <a:defRPr sz="3500" b="1">
-                <a:solidFill>
-                  <a:srgbClr val="00FAA5"/>
-                </a:solidFill>
-              </a:defRPr>
-            </a:pPr>
-            <a:r>
-              <a:rPr dirty="0">
-                <a:latin typeface="Microsoft YaHei Light" charset="-122"/>
-                <a:ea typeface="Microsoft YaHei Light" charset="-122"/>
-                <a:cs typeface="Microsoft YaHei Light" charset="-122"/>
-              </a:rPr>
-              <a:t>       通过独立解决问题、探索答案、项目筹备等一系列过程，当我再次打开这封信的时候，我希望这时候的自己：</a:t>
-            </a:r>
-          </a:p>
-          <a:p>
-            <a:pPr lvl="5" indent="1143000" algn="l" defTabSz="821529">
-              <a:lnSpc>
-                <a:spcPct val="120000"/>
-              </a:lnSpc>
-              <a:defRPr sz="3500" b="1">
-                <a:solidFill>
-                  <a:srgbClr val="00FAA5"/>
-                </a:solidFill>
-              </a:defRPr>
-            </a:pPr>
-            <a:r>
-              <a:rPr dirty="0">
-                <a:latin typeface="Microsoft YaHei Light" charset="-122"/>
-                <a:ea typeface="Microsoft YaHei Light" charset="-122"/>
-                <a:cs typeface="Microsoft YaHei Light" charset="-122"/>
-              </a:rPr>
-              <a:t>1. 成为训练营那仅有的一枚优秀学员；</a:t>
-            </a:r>
-            <a:r>
-              <a:rPr dirty="0">
-                <a:solidFill>
-                  <a:srgbClr val="FFFB00"/>
-                </a:solidFill>
-                <a:latin typeface="Microsoft YaHei Light" charset="-122"/>
-                <a:ea typeface="Microsoft YaHei Light" charset="-122"/>
-                <a:cs typeface="Microsoft YaHei Light" charset="-122"/>
-              </a:rPr>
-              <a:t>（更换成自己的内容）</a:t>
-            </a:r>
-          </a:p>
-          <a:p>
-            <a:pPr lvl="5" indent="1143000" algn="l" defTabSz="821529">
-              <a:lnSpc>
-                <a:spcPct val="120000"/>
-              </a:lnSpc>
-              <a:defRPr sz="3500" b="1">
-                <a:solidFill>
-                  <a:srgbClr val="00FAA5"/>
-                </a:solidFill>
-              </a:defRPr>
-            </a:pPr>
-            <a:r>
-              <a:rPr dirty="0">
-                <a:latin typeface="Microsoft YaHei Light" charset="-122"/>
-                <a:ea typeface="Microsoft YaHei Light" charset="-122"/>
-                <a:cs typeface="Microsoft YaHei Light" charset="-122"/>
-              </a:rPr>
-              <a:t>2. 亲手独立构建起属于自己的网站；</a:t>
-            </a:r>
-            <a:r>
-              <a:rPr dirty="0">
-                <a:solidFill>
-                  <a:srgbClr val="FFFB00"/>
-                </a:solidFill>
-                <a:latin typeface="Microsoft YaHei Light" charset="-122"/>
-                <a:ea typeface="Microsoft YaHei Light" charset="-122"/>
-                <a:cs typeface="Microsoft YaHei Light" charset="-122"/>
-              </a:rPr>
-              <a:t>（更换成自己的内容）</a:t>
-            </a:r>
-          </a:p>
-          <a:p>
-            <a:pPr lvl="5" indent="1143000" algn="l" defTabSz="821529">
-              <a:lnSpc>
-                <a:spcPct val="120000"/>
-              </a:lnSpc>
-              <a:defRPr sz="3500" b="1">
-                <a:solidFill>
-                  <a:srgbClr val="00FAA5"/>
-                </a:solidFill>
-              </a:defRPr>
-            </a:pPr>
-            <a:r>
-              <a:rPr dirty="0">
-                <a:latin typeface="Microsoft YaHei Light" charset="-122"/>
-                <a:ea typeface="Microsoft YaHei Light" charset="-122"/>
-                <a:cs typeface="Microsoft YaHei Light" charset="-122"/>
-              </a:rPr>
-              <a:t>3. 启动自己心心念念的个人电台啦！</a:t>
-            </a:r>
-            <a:r>
-              <a:rPr dirty="0">
-                <a:solidFill>
-                  <a:srgbClr val="FFFB00"/>
-                </a:solidFill>
-                <a:latin typeface="Microsoft YaHei Light" charset="-122"/>
-                <a:ea typeface="Microsoft YaHei Light" charset="-122"/>
-                <a:cs typeface="Microsoft YaHei Light" charset="-122"/>
-              </a:rPr>
-              <a:t>（更换成自己的内容）</a:t>
-            </a:r>
-          </a:p>
-          <a:p>
-            <a:pPr lvl="5" indent="1143000" algn="l" defTabSz="821529">
-              <a:lnSpc>
-                <a:spcPct val="120000"/>
-              </a:lnSpc>
-              <a:defRPr sz="3500" b="1">
-                <a:solidFill>
-                  <a:srgbClr val="00FAA5"/>
-                </a:solidFill>
-              </a:defRPr>
-            </a:pPr>
-            <a:r>
-              <a:rPr dirty="0" smtClean="0">
-                <a:latin typeface="Microsoft YaHei Light" charset="-122"/>
-                <a:ea typeface="Microsoft YaHei Light" charset="-122"/>
-                <a:cs typeface="Microsoft YaHei Light" charset="-122"/>
-              </a:rPr>
-              <a:t>4</a:t>
-            </a:r>
-            <a:r>
-              <a:rPr lang="en-US" dirty="0" smtClean="0">
-                <a:latin typeface="Microsoft YaHei Light" charset="-122"/>
-                <a:ea typeface="Microsoft YaHei Light" charset="-122"/>
-                <a:cs typeface="Microsoft YaHei Light" charset="-122"/>
-              </a:rPr>
-              <a:t>. </a:t>
-            </a:r>
-            <a:r>
-              <a:rPr dirty="0" smtClean="0">
-                <a:latin typeface="Microsoft YaHei Light" charset="-122"/>
-                <a:ea typeface="Microsoft YaHei Light" charset="-122"/>
-                <a:cs typeface="Microsoft YaHei Light" charset="-122"/>
-              </a:rPr>
-              <a:t>…….</a:t>
-            </a:r>
-            <a:r>
-              <a:rPr dirty="0" smtClean="0">
-                <a:solidFill>
-                  <a:srgbClr val="FFFB00"/>
-                </a:solidFill>
-                <a:latin typeface="Microsoft YaHei Light" charset="-122"/>
-                <a:ea typeface="Microsoft YaHei Light" charset="-122"/>
-                <a:cs typeface="Microsoft YaHei Light" charset="-122"/>
-              </a:rPr>
-              <a:t>（</a:t>
-            </a:r>
-            <a:r>
-              <a:rPr dirty="0">
-                <a:solidFill>
-                  <a:srgbClr val="FFFB00"/>
-                </a:solidFill>
-                <a:latin typeface="Microsoft YaHei Light" charset="-122"/>
-                <a:ea typeface="Microsoft YaHei Light" charset="-122"/>
-                <a:cs typeface="Microsoft YaHei Light" charset="-122"/>
-              </a:rPr>
-              <a:t>更换成自己的内容）</a:t>
-            </a:r>
-          </a:p>
-        </p:txBody>
-      </p:sp>
-      <p:sp>
-        <p:nvSpPr>
-          <p:cNvPr id="197" name="Shape 197"/>
-          <p:cNvSpPr/>
-          <p:nvPr/>
-        </p:nvSpPr>
-        <p:spPr>
-          <a:xfrm>
-            <a:off x="7782137" y="817206"/>
-            <a:ext cx="8819722" cy="872034"/>
-          </a:xfrm>
-          <a:prstGeom prst="rect">
-            <a:avLst/>
-          </a:prstGeom>
-          <a:ln w="12700">
-            <a:miter lim="400000"/>
-          </a:ln>
-          <a:extLst>
-            <a:ext uri="{C572A759-6A51-4108-AA02-DFA0A04FC94B}">
-              <ma14:wrappingTextBoxFlag xmlns:ma14="http://schemas.microsoft.com/office/mac/drawingml/2011/main" val="1"/>
-            </a:ext>
-          </a:extLst>
-        </p:spPr>
-        <p:txBody>
-          <a:bodyPr wrap="none" lIns="50800" tIns="50800" rIns="50800" bIns="50800" anchor="ctr">
-            <a:spAutoFit/>
-          </a:bodyPr>
-          <a:lstStyle>
-            <a:lvl1pPr>
-              <a:defRPr b="1">
-                <a:solidFill>
-                  <a:srgbClr val="00FAA5"/>
-                </a:solidFill>
-              </a:defRPr>
-            </a:lvl1pPr>
-          </a:lstStyle>
-          <a:p>
-            <a:r>
-              <a:rPr dirty="0">
-                <a:latin typeface="Microsoft YaHei" charset="-122"/>
-                <a:ea typeface="Microsoft YaHei" charset="-122"/>
-                <a:cs typeface="Microsoft YaHei" charset="-122"/>
-              </a:rPr>
-              <a:t>半撇私塾慢递 ｜ 写给未来的信</a:t>
-            </a:r>
-          </a:p>
-        </p:txBody>
-      </p:sp>
-      <p:sp>
-        <p:nvSpPr>
-          <p:cNvPr id="198" name="Shape 198"/>
-          <p:cNvSpPr/>
-          <p:nvPr/>
-        </p:nvSpPr>
-        <p:spPr>
-          <a:xfrm>
-            <a:off x="5888182" y="2601801"/>
-            <a:ext cx="14074380" cy="734560"/>
-          </a:xfrm>
-          <a:prstGeom prst="rect">
-            <a:avLst/>
-          </a:prstGeom>
-          <a:ln w="38100">
-            <a:solidFill>
-              <a:srgbClr val="00FAA5">
-                <a:alpha val="40000"/>
-              </a:srgbClr>
-            </a:solidFill>
-            <a:miter lim="400000"/>
-          </a:ln>
-        </p:spPr>
-        <p:txBody>
-          <a:bodyPr lIns="50800" tIns="50800" rIns="50800" bIns="50800" anchor="ctr"/>
-          <a:lstStyle/>
-          <a:p>
-            <a:pPr algn="l">
-              <a:defRPr sz="4300">
-                <a:latin typeface="Lantinghei SC Extralight"/>
-                <a:ea typeface="Lantinghei SC Extralight"/>
-                <a:cs typeface="Lantinghei SC Extralight"/>
-                <a:sym typeface="Lantinghei SC Extralight"/>
-              </a:defRPr>
-            </a:pPr>
-            <a:endParaRPr/>
-          </a:p>
-        </p:txBody>
-      </p:sp>
-      <p:sp>
-        <p:nvSpPr>
-          <p:cNvPr id="199" name="Shape 199"/>
-          <p:cNvSpPr/>
-          <p:nvPr/>
-        </p:nvSpPr>
-        <p:spPr>
-          <a:xfrm>
-            <a:off x="4371561" y="3634316"/>
-            <a:ext cx="1041947" cy="735837"/>
-          </a:xfrm>
-          <a:prstGeom prst="rect">
-            <a:avLst/>
-          </a:prstGeom>
-          <a:ln w="12700">
-            <a:miter lim="400000"/>
-          </a:ln>
-          <a:extLst>
-            <a:ext uri="{C572A759-6A51-4108-AA02-DFA0A04FC94B}">
-              <ma14:wrappingTextBoxFlag xmlns:ma14="http://schemas.microsoft.com/office/mac/drawingml/2011/main" val="1"/>
-            </a:ext>
-          </a:extLst>
-        </p:spPr>
-        <p:txBody>
-          <a:bodyPr wrap="none" lIns="71435" tIns="71435" rIns="71435" bIns="71435">
-            <a:spAutoFit/>
-          </a:bodyPr>
-          <a:lstStyle/>
-          <a:p>
-            <a:pPr algn="r" defTabSz="821529">
-              <a:lnSpc>
-                <a:spcPct val="120000"/>
-              </a:lnSpc>
-            </a:pPr>
-            <a:r>
-              <a:rPr sz="3500" b="1" dirty="0">
-                <a:solidFill>
-                  <a:srgbClr val="00FAA5"/>
-                </a:solidFill>
-                <a:latin typeface="Microsoft YaHei Light" charset="-122"/>
-                <a:ea typeface="Microsoft YaHei Light" charset="-122"/>
-                <a:cs typeface="Microsoft YaHei Light" charset="-122"/>
-              </a:rPr>
-              <a:t>主题</a:t>
-            </a:r>
-          </a:p>
-        </p:txBody>
-      </p:sp>
-      <p:sp>
-        <p:nvSpPr>
-          <p:cNvPr id="200" name="Shape 200"/>
-          <p:cNvSpPr/>
-          <p:nvPr/>
-        </p:nvSpPr>
-        <p:spPr>
-          <a:xfrm>
-            <a:off x="5888182" y="3673216"/>
-            <a:ext cx="14074380" cy="765178"/>
-          </a:xfrm>
-          <a:prstGeom prst="rect">
-            <a:avLst/>
-          </a:prstGeom>
-          <a:ln w="38100">
-            <a:solidFill>
-              <a:srgbClr val="00FAA5">
-                <a:alpha val="40000"/>
-              </a:srgbClr>
-            </a:solidFill>
-            <a:miter lim="400000"/>
-          </a:ln>
-        </p:spPr>
-        <p:txBody>
-          <a:bodyPr lIns="50800" tIns="50800" rIns="50800" bIns="50800" anchor="ctr"/>
-          <a:lstStyle/>
-          <a:p>
-            <a:pPr algn="l">
-              <a:defRPr sz="4300">
-                <a:latin typeface="Lantinghei SC Extralight"/>
-                <a:ea typeface="Lantinghei SC Extralight"/>
-                <a:cs typeface="Lantinghei SC Extralight"/>
-                <a:sym typeface="Lantinghei SC Extralight"/>
-              </a:defRPr>
-            </a:pPr>
-            <a:endParaRPr/>
-          </a:p>
-        </p:txBody>
-      </p:sp>
-      <p:sp>
-        <p:nvSpPr>
-          <p:cNvPr id="201" name="Shape 201"/>
-          <p:cNvSpPr/>
-          <p:nvPr/>
-        </p:nvSpPr>
-        <p:spPr>
-          <a:xfrm>
-            <a:off x="4371561" y="4657509"/>
-            <a:ext cx="1041947" cy="735837"/>
-          </a:xfrm>
-          <a:prstGeom prst="rect">
-            <a:avLst/>
-          </a:prstGeom>
-          <a:ln w="12700">
-            <a:miter lim="400000"/>
-          </a:ln>
-          <a:extLst>
-            <a:ext uri="{C572A759-6A51-4108-AA02-DFA0A04FC94B}">
-              <ma14:wrappingTextBoxFlag xmlns:ma14="http://schemas.microsoft.com/office/mac/drawingml/2011/main" val="1"/>
-            </a:ext>
-          </a:extLst>
-        </p:spPr>
-        <p:txBody>
-          <a:bodyPr wrap="none" lIns="71435" tIns="71435" rIns="71435" bIns="71435">
-            <a:spAutoFit/>
-          </a:bodyPr>
-          <a:lstStyle/>
-          <a:p>
-            <a:pPr algn="r" defTabSz="821529">
-              <a:lnSpc>
-                <a:spcPct val="120000"/>
-              </a:lnSpc>
-            </a:pPr>
-            <a:r>
-              <a:rPr sz="3500" b="1" dirty="0">
-                <a:solidFill>
-                  <a:srgbClr val="00FAA5"/>
-                </a:solidFill>
-                <a:latin typeface="Microsoft YaHei Light" charset="-122"/>
-                <a:ea typeface="Microsoft YaHei Light" charset="-122"/>
-                <a:cs typeface="Microsoft YaHei Light" charset="-122"/>
-              </a:rPr>
-              <a:t>正文</a:t>
-            </a:r>
-          </a:p>
-        </p:txBody>
-      </p:sp>
-      <p:sp>
-        <p:nvSpPr>
-          <p:cNvPr id="202" name="Shape 202"/>
-          <p:cNvSpPr/>
-          <p:nvPr/>
-        </p:nvSpPr>
-        <p:spPr>
-          <a:xfrm>
-            <a:off x="5888182" y="4810738"/>
-            <a:ext cx="14074380" cy="7217700"/>
-          </a:xfrm>
-          <a:prstGeom prst="rect">
-            <a:avLst/>
-          </a:prstGeom>
-          <a:ln w="38100">
-            <a:solidFill>
-              <a:srgbClr val="00FAA5"/>
-            </a:solidFill>
-            <a:miter lim="400000"/>
-          </a:ln>
-        </p:spPr>
-        <p:txBody>
-          <a:bodyPr lIns="50800" tIns="50800" rIns="50800" bIns="50800" anchor="ctr"/>
-          <a:lstStyle/>
-          <a:p>
-            <a:pPr algn="l">
-              <a:defRPr sz="4300">
-                <a:latin typeface="Lantinghei SC Extralight"/>
-                <a:ea typeface="Lantinghei SC Extralight"/>
-                <a:cs typeface="Lantinghei SC Extralight"/>
-                <a:sym typeface="Lantinghei SC Extralight"/>
-              </a:defRPr>
-            </a:pPr>
-            <a:endParaRPr/>
-          </a:p>
-        </p:txBody>
-      </p:sp>
-      <p:sp>
-        <p:nvSpPr>
-          <p:cNvPr id="203" name="Shape 203"/>
-          <p:cNvSpPr/>
-          <p:nvPr/>
-        </p:nvSpPr>
-        <p:spPr>
-          <a:xfrm>
-            <a:off x="6067926" y="2593207"/>
-            <a:ext cx="2837310" cy="735837"/>
-          </a:xfrm>
-          <a:prstGeom prst="rect">
-            <a:avLst/>
-          </a:prstGeom>
-          <a:ln w="12700">
-            <a:miter lim="400000"/>
-          </a:ln>
-          <a:extLst>
-            <a:ext uri="{C572A759-6A51-4108-AA02-DFA0A04FC94B}">
-              <ma14:wrappingTextBoxFlag xmlns:ma14="http://schemas.microsoft.com/office/mac/drawingml/2011/main" val="1"/>
-            </a:ext>
-          </a:extLst>
-        </p:spPr>
-        <p:txBody>
-          <a:bodyPr wrap="none" lIns="71435" tIns="71435" rIns="71435" bIns="71435">
-            <a:spAutoFit/>
-          </a:bodyPr>
-          <a:lstStyle/>
-          <a:p>
-            <a:pPr algn="l" defTabSz="821529">
-              <a:lnSpc>
-                <a:spcPct val="120000"/>
-              </a:lnSpc>
-              <a:defRPr sz="3500" b="1">
-                <a:solidFill>
-                  <a:srgbClr val="00FAA5"/>
-                </a:solidFill>
-              </a:defRPr>
-            </a:pPr>
-            <a:r>
-              <a:rPr lang="en-US" altLang="zh-CN" dirty="0" smtClean="0">
-                <a:solidFill>
-                  <a:srgbClr val="FFFF00"/>
-                </a:solidFill>
-                <a:latin typeface="Microsoft YaHei Light" charset="-122"/>
-                <a:ea typeface="Microsoft YaHei Light" charset="-122"/>
-                <a:cs typeface="Microsoft YaHei Light" charset="-122"/>
-              </a:rPr>
-              <a:t>【</a:t>
-            </a:r>
             <a:r>
               <a:rPr lang="zh-CN" altLang="en-US" dirty="0" smtClean="0">
                 <a:solidFill>
-                  <a:srgbClr val="FFFF00"/>
-                </a:solidFill>
-                <a:latin typeface="Microsoft YaHei Light" charset="-122"/>
-                <a:ea typeface="Microsoft YaHei Light" charset="-122"/>
-                <a:cs typeface="Microsoft YaHei Light" charset="-122"/>
-              </a:rPr>
-              <a:t>你的名字</a:t>
-            </a:r>
-            <a:r>
-              <a:rPr lang="en-US" altLang="zh-CN" dirty="0" smtClean="0">
-                <a:solidFill>
-                  <a:srgbClr val="FFFF00"/>
-                </a:solidFill>
-                <a:latin typeface="Microsoft YaHei Light" charset="-122"/>
-                <a:ea typeface="Microsoft YaHei Light" charset="-122"/>
-                <a:cs typeface="Microsoft YaHei Light" charset="-122"/>
-              </a:rPr>
-              <a:t>】</a:t>
-            </a:r>
-            <a:endParaRPr dirty="0">
-              <a:solidFill>
-                <a:srgbClr val="FFFF00"/>
-              </a:solidFill>
-              <a:latin typeface="Microsoft YaHei Light" charset="-122"/>
-              <a:ea typeface="Microsoft YaHei Light" charset="-122"/>
-              <a:cs typeface="Microsoft YaHei Light" charset="-122"/>
-            </a:endParaRPr>
-          </a:p>
-        </p:txBody>
-      </p:sp>
-      <p:sp>
-        <p:nvSpPr>
-          <p:cNvPr id="204" name="Shape 204"/>
-          <p:cNvSpPr/>
-          <p:nvPr/>
-        </p:nvSpPr>
-        <p:spPr>
-          <a:xfrm>
-            <a:off x="6067926" y="3683534"/>
-            <a:ext cx="3734992" cy="735837"/>
-          </a:xfrm>
-          <a:prstGeom prst="rect">
-            <a:avLst/>
-          </a:prstGeom>
-          <a:ln w="12700">
-            <a:miter lim="400000"/>
-          </a:ln>
-          <a:extLst>
-            <a:ext uri="{C572A759-6A51-4108-AA02-DFA0A04FC94B}">
-              <ma14:wrappingTextBoxFlag xmlns:ma14="http://schemas.microsoft.com/office/mac/drawingml/2011/main" val="1"/>
-            </a:ext>
-          </a:extLst>
-        </p:spPr>
-        <p:txBody>
-          <a:bodyPr wrap="none" lIns="71435" tIns="71435" rIns="71435" bIns="71435">
-            <a:spAutoFit/>
-          </a:bodyPr>
-          <a:lstStyle/>
-          <a:p>
-            <a:pPr algn="l" defTabSz="821529">
-              <a:lnSpc>
-                <a:spcPct val="120000"/>
-              </a:lnSpc>
-              <a:defRPr sz="3500" b="1">
-                <a:solidFill>
-                  <a:srgbClr val="00FAA5"/>
-                </a:solidFill>
-              </a:defRPr>
-            </a:pPr>
-            <a:r>
-              <a:rPr lang="en-US" altLang="zh-CN" dirty="0" smtClean="0">
-                <a:solidFill>
-                  <a:srgbClr val="FFFF00"/>
+                  <a:schemeClr val="tx2">
+                    <a:lumMod val="60000"/>
+                    <a:lumOff val="40000"/>
+                  </a:schemeClr>
                 </a:solidFill>
                 <a:latin typeface="Microsoft YaHei" charset="-122"/>
                 <a:ea typeface="Microsoft YaHei" charset="-122"/>
                 <a:cs typeface="Microsoft YaHei" charset="-122"/>
               </a:rPr>
-              <a:t>【</a:t>
-            </a:r>
-            <a:r>
-              <a:rPr lang="zh-CN" altLang="en-US" dirty="0" smtClean="0">
+              <a:t>打开微信扫描二维码，生成一封</a:t>
+            </a:r>
+            <a:r>
+              <a:rPr lang="en-US" altLang="zh-CN" dirty="0" smtClean="0">
                 <a:solidFill>
-                  <a:srgbClr val="FFFF00"/>
+                  <a:schemeClr val="tx2">
+                    <a:lumMod val="60000"/>
+                    <a:lumOff val="40000"/>
+                  </a:schemeClr>
                 </a:solidFill>
                 <a:latin typeface="Microsoft YaHei" charset="-122"/>
                 <a:ea typeface="Microsoft YaHei" charset="-122"/>
                 <a:cs typeface="Microsoft YaHei" charset="-122"/>
               </a:rPr>
-              <a:t>你的信件标题</a:t>
-            </a:r>
-            <a:r>
-              <a:rPr lang="en-US" altLang="zh-CN" dirty="0" smtClean="0">
+              <a:t>《</a:t>
+            </a:r>
+            <a:r>
+              <a:rPr lang="zh-CN" altLang="en-US" dirty="0" smtClean="0">
                 <a:solidFill>
-                  <a:srgbClr val="FFFF00"/>
+                  <a:schemeClr val="tx2">
+                    <a:lumMod val="60000"/>
+                    <a:lumOff val="40000"/>
+                  </a:schemeClr>
                 </a:solidFill>
                 <a:latin typeface="Microsoft YaHei" charset="-122"/>
                 <a:ea typeface="Microsoft YaHei" charset="-122"/>
                 <a:cs typeface="Microsoft YaHei" charset="-122"/>
               </a:rPr>
-              <a:t>】</a:t>
-            </a:r>
-            <a:endParaRPr dirty="0">
+              <a:t>致未来的信</a:t>
+            </a:r>
+            <a:r>
+              <a:rPr lang="en-US" altLang="zh-CN" dirty="0" smtClean="0">
+                <a:solidFill>
+                  <a:schemeClr val="tx2">
+                    <a:lumMod val="60000"/>
+                    <a:lumOff val="40000"/>
+                  </a:schemeClr>
+                </a:solidFill>
+                <a:latin typeface="Microsoft YaHei" charset="-122"/>
+                <a:ea typeface="Microsoft YaHei" charset="-122"/>
+                <a:cs typeface="Microsoft YaHei" charset="-122"/>
+              </a:rPr>
+              <a:t>》</a:t>
+            </a:r>
+            <a:endParaRPr lang="zh-CN" altLang="en-US" dirty="0">
               <a:solidFill>
-                <a:srgbClr val="FFFF00"/>
+                <a:schemeClr val="tx2">
+                  <a:lumMod val="60000"/>
+                  <a:lumOff val="40000"/>
+                </a:schemeClr>
               </a:solidFill>
               <a:latin typeface="Microsoft YaHei" charset="-122"/>
               <a:ea typeface="Microsoft YaHei" charset="-122"/>
@@ -5622,99 +5077,62 @@
           </a:p>
         </p:txBody>
       </p:sp>
-      <p:sp>
-        <p:nvSpPr>
-          <p:cNvPr id="205" name="Shape 205"/>
-          <p:cNvSpPr/>
+      <p:pic>
+        <p:nvPicPr>
+          <p:cNvPr id="4" name="图片 3"/>
+          <p:cNvPicPr>
+            <a:picLocks noChangeAspect="1"/>
+          </p:cNvPicPr>
           <p:nvPr/>
-        </p:nvSpPr>
+        </p:nvPicPr>
+        <p:blipFill>
+          <a:blip r:embed="rId2">
+            <a:extLst>
+              <a:ext uri="{28A0092B-C50C-407E-A947-70E740481C1C}">
+                <a14:useLocalDpi xmlns:a14="http://schemas.microsoft.com/office/drawing/2010/main" val="0"/>
+              </a:ext>
+            </a:extLst>
+          </a:blip>
+          <a:stretch>
+            <a:fillRect/>
+          </a:stretch>
+        </p:blipFill>
         <p:spPr>
           <a:xfrm>
-            <a:off x="6312495" y="12334510"/>
-            <a:ext cx="1041947" cy="790596"/>
+            <a:off x="3803073" y="4819084"/>
+            <a:ext cx="4239491" cy="4239491"/>
           </a:xfrm>
           <a:prstGeom prst="rect">
             <a:avLst/>
           </a:prstGeom>
-          <a:ln w="12700">
-            <a:miter lim="400000"/>
-          </a:ln>
-          <a:extLst>
-            <a:ext uri="{C572A759-6A51-4108-AA02-DFA0A04FC94B}">
-              <ma14:wrappingTextBoxFlag xmlns:ma14="http://schemas.microsoft.com/office/mac/drawingml/2011/main" val="1"/>
-            </a:ext>
-          </a:extLst>
+          <a:effectLst>
+            <a:glow>
+              <a:schemeClr val="bg2">
+                <a:alpha val="40000"/>
+              </a:schemeClr>
+            </a:glow>
+            <a:softEdge rad="0"/>
+          </a:effectLst>
         </p:spPr>
-        <p:txBody>
-          <a:bodyPr wrap="none" lIns="71435" tIns="71435" rIns="71435" bIns="71435">
-            <a:spAutoFit/>
-          </a:bodyPr>
-          <a:lstStyle/>
-          <a:p>
-            <a:pPr algn="l" defTabSz="821529">
-              <a:lnSpc>
-                <a:spcPct val="120000"/>
-              </a:lnSpc>
-            </a:pPr>
-            <a:r>
-              <a:rPr sz="3500" b="1" dirty="0">
-                <a:solidFill>
-                  <a:srgbClr val="00FAA5"/>
-                </a:solidFill>
-                <a:latin typeface="Microsoft YaHei Light" charset="-122"/>
-                <a:ea typeface="Microsoft YaHei Light" charset="-122"/>
-                <a:cs typeface="Microsoft YaHei Light" charset="-122"/>
-              </a:rPr>
-              <a:t>发送</a:t>
-            </a:r>
-          </a:p>
-        </p:txBody>
-      </p:sp>
-      <p:sp>
-        <p:nvSpPr>
-          <p:cNvPr id="206" name="Shape 206"/>
-          <p:cNvSpPr/>
-          <p:nvPr/>
-        </p:nvSpPr>
-        <p:spPr>
-          <a:xfrm>
-            <a:off x="5888182" y="12347219"/>
-            <a:ext cx="1890575" cy="765178"/>
-          </a:xfrm>
-          <a:prstGeom prst="rect">
-            <a:avLst/>
-          </a:prstGeom>
-          <a:ln w="38100">
-            <a:solidFill>
-              <a:srgbClr val="00FAA5">
-                <a:alpha val="40000"/>
-              </a:srgbClr>
-            </a:solidFill>
-            <a:miter lim="400000"/>
-          </a:ln>
-        </p:spPr>
-        <p:txBody>
-          <a:bodyPr lIns="50800" tIns="50800" rIns="50800" bIns="50800" anchor="ctr"/>
-          <a:lstStyle/>
-          <a:p>
-            <a:pPr algn="l">
-              <a:defRPr>
-                <a:latin typeface="Lantinghei SC Extralight"/>
-                <a:ea typeface="Lantinghei SC Extralight"/>
-                <a:cs typeface="Lantinghei SC Extralight"/>
-                <a:sym typeface="Lantinghei SC Extralight"/>
-              </a:defRPr>
-            </a:pPr>
-            <a:endParaRPr/>
-          </a:p>
-        </p:txBody>
-      </p:sp>
+      </p:pic>
     </p:spTree>
+    <p:extLst>
+      <p:ext uri="{BB962C8B-B14F-4D97-AF65-F5344CB8AC3E}">
+        <p14:creationId xmlns:p14="http://schemas.microsoft.com/office/powerpoint/2010/main" val="1345231753"/>
+      </p:ext>
+    </p:extLst>
   </p:cSld>
   <p:clrMapOvr>
     <a:masterClrMapping/>
   </p:clrMapOvr>
   <p:transition spd="med"/>
+  <p:timing>
+    <p:tnLst>
+      <p:par>
+        <p:cTn id="1" dur="indefinite" restart="never" nodeType="tmRoot"/>
+      </p:par>
+    </p:tnLst>
+  </p:timing>
 </p:sld>
 </file>
 

</xml_diff>